<commit_message>
Fin de ma partie (Alban)
</commit_message>
<xml_diff>
--- a/doc/presentation.pptx
+++ b/doc/presentation.pptx
@@ -223,7 +223,7 @@
           <a:p>
             <a:fld id="{D6CDC2E4-580B-4A4C-AEF3-6D60A3D71BED}" type="datetimeFigureOut">
               <a:rPr lang="fr-FR" smtClean="0"/>
-              <a:t>02/12/2015</a:t>
+              <a:t>03/12/2015</a:t>
             </a:fld>
             <a:endParaRPr lang="fr-FR"/>
           </a:p>
@@ -6161,25 +6161,35 @@
           </a:p>
         </p:txBody>
       </p:sp>
-      <p:sp>
-        <p:nvSpPr>
-          <p:cNvPr id="3" name="Espace réservé du contenu 2"/>
-          <p:cNvSpPr>
-            <a:spLocks noGrp="1"/>
-          </p:cNvSpPr>
+      <p:pic>
+        <p:nvPicPr>
+          <p:cNvPr id="5" name="Espace réservé du contenu 4"/>
+          <p:cNvPicPr>
+            <a:picLocks noGrp="1" noChangeAspect="1"/>
+          </p:cNvPicPr>
           <p:nvPr>
             <p:ph sz="quarter" idx="1"/>
           </p:nvPr>
-        </p:nvSpPr>
-        <p:spPr/>
-        <p:txBody>
-          <a:bodyPr/>
-          <a:lstStyle/>
-          <a:p>
-            <a:endParaRPr lang="fr-FR" dirty="0"/>
-          </a:p>
-        </p:txBody>
-      </p:sp>
+        </p:nvPicPr>
+        <p:blipFill>
+          <a:blip r:embed="rId2">
+            <a:extLst>
+              <a:ext uri="{28A0092B-C50C-407E-A947-70E740481C1C}">
+                <a14:useLocalDpi xmlns:a14="http://schemas.microsoft.com/office/drawing/2010/main" val="0"/>
+              </a:ext>
+            </a:extLst>
+          </a:blip>
+          <a:stretch>
+            <a:fillRect/>
+          </a:stretch>
+        </p:blipFill>
+        <p:spPr>
+          <a:xfrm>
+            <a:off x="4587436" y="2267669"/>
+            <a:ext cx="4149106" cy="4463731"/>
+          </a:xfrm>
+        </p:spPr>
+      </p:pic>
       <p:sp>
         <p:nvSpPr>
           <p:cNvPr id="4" name="Espace réservé du numéro de diapositive 4"/>
@@ -6220,6 +6230,858 @@
                 </a:schemeClr>
               </a:solidFill>
             </a:endParaRPr>
+          </a:p>
+        </p:txBody>
+      </p:sp>
+      <p:sp>
+        <p:nvSpPr>
+          <p:cNvPr id="6" name="Espace réservé du contenu 2"/>
+          <p:cNvSpPr txBox="1">
+            <a:spLocks/>
+          </p:cNvSpPr>
+          <p:nvPr/>
+        </p:nvSpPr>
+        <p:spPr>
+          <a:xfrm>
+            <a:off x="504031" y="2180119"/>
+            <a:ext cx="4392265" cy="508267"/>
+          </a:xfrm>
+          <a:prstGeom prst="rect">
+            <a:avLst/>
+          </a:prstGeom>
+        </p:spPr>
+        <p:txBody>
+          <a:bodyPr vert="horz" lIns="100794" tIns="50397" rIns="100794" bIns="50397">
+            <a:normAutofit/>
+          </a:bodyPr>
+          <a:lstStyle>
+            <a:lvl1pPr marL="302383" indent="-302383" algn="l" rtl="0" eaLnBrk="1" latinLnBrk="0" hangingPunct="1">
+              <a:spcBef>
+                <a:spcPts val="661"/>
+              </a:spcBef>
+              <a:buClr>
+                <a:schemeClr val="accent1"/>
+              </a:buClr>
+              <a:buSzPct val="70000"/>
+              <a:buFont typeface="Wingdings"/>
+              <a:buChar char=""/>
+              <a:defRPr kumimoji="0" sz="2600" kern="1200">
+                <a:solidFill>
+                  <a:schemeClr val="tx1"/>
+                </a:solidFill>
+                <a:latin typeface="+mn-lt"/>
+                <a:ea typeface="+mn-ea"/>
+                <a:cs typeface="+mn-cs"/>
+              </a:defRPr>
+            </a:lvl1pPr>
+            <a:lvl2pPr marL="705560" indent="-302383" algn="l" rtl="0" eaLnBrk="1" latinLnBrk="0" hangingPunct="1">
+              <a:spcBef>
+                <a:spcPct val="20000"/>
+              </a:spcBef>
+              <a:buClr>
+                <a:schemeClr val="accent1"/>
+              </a:buClr>
+              <a:buSzPct val="80000"/>
+              <a:buFont typeface="Wingdings 2"/>
+              <a:buChar char=""/>
+              <a:defRPr kumimoji="0" sz="2300" kern="1200">
+                <a:solidFill>
+                  <a:schemeClr val="tx1"/>
+                </a:solidFill>
+                <a:latin typeface="+mn-lt"/>
+                <a:ea typeface="+mn-ea"/>
+                <a:cs typeface="+mn-cs"/>
+              </a:defRPr>
+            </a:lvl2pPr>
+            <a:lvl3pPr marL="1007943" indent="-201589" algn="l" rtl="0" eaLnBrk="1" latinLnBrk="0" hangingPunct="1">
+              <a:spcBef>
+                <a:spcPct val="20000"/>
+              </a:spcBef>
+              <a:buClr>
+                <a:schemeClr val="accent1">
+                  <a:shade val="75000"/>
+                </a:schemeClr>
+              </a:buClr>
+              <a:buSzPct val="60000"/>
+              <a:buFont typeface="Wingdings"/>
+              <a:buChar char=""/>
+              <a:defRPr kumimoji="0" sz="2000" kern="1200">
+                <a:solidFill>
+                  <a:schemeClr val="tx1"/>
+                </a:solidFill>
+                <a:latin typeface="+mn-lt"/>
+                <a:ea typeface="+mn-ea"/>
+                <a:cs typeface="+mn-cs"/>
+              </a:defRPr>
+            </a:lvl3pPr>
+            <a:lvl4pPr marL="1310326" indent="-201589" algn="l" rtl="0" eaLnBrk="1" latinLnBrk="0" hangingPunct="1">
+              <a:spcBef>
+                <a:spcPct val="20000"/>
+              </a:spcBef>
+              <a:buClr>
+                <a:schemeClr val="accent1">
+                  <a:tint val="60000"/>
+                </a:schemeClr>
+              </a:buClr>
+              <a:buSzPct val="60000"/>
+              <a:buFont typeface="Wingdings"/>
+              <a:buChar char=""/>
+              <a:defRPr kumimoji="0" sz="2000" kern="1200">
+                <a:solidFill>
+                  <a:schemeClr val="tx1"/>
+                </a:solidFill>
+                <a:latin typeface="+mn-lt"/>
+                <a:ea typeface="+mn-ea"/>
+                <a:cs typeface="+mn-cs"/>
+              </a:defRPr>
+            </a:lvl4pPr>
+            <a:lvl5pPr marL="1612709" indent="-201589" algn="l" rtl="0" eaLnBrk="1" latinLnBrk="0" hangingPunct="1">
+              <a:spcBef>
+                <a:spcPct val="20000"/>
+              </a:spcBef>
+              <a:buClr>
+                <a:schemeClr val="accent2">
+                  <a:tint val="60000"/>
+                </a:schemeClr>
+              </a:buClr>
+              <a:buSzPct val="68000"/>
+              <a:buFont typeface="Wingdings 2"/>
+              <a:buChar char=""/>
+              <a:defRPr kumimoji="0" sz="1800" kern="1200">
+                <a:solidFill>
+                  <a:schemeClr val="tx1"/>
+                </a:solidFill>
+                <a:latin typeface="+mn-lt"/>
+                <a:ea typeface="+mn-ea"/>
+                <a:cs typeface="+mn-cs"/>
+              </a:defRPr>
+            </a:lvl5pPr>
+            <a:lvl6pPr marL="1915092" indent="-201589" algn="l" rtl="0" eaLnBrk="1" latinLnBrk="0" hangingPunct="1">
+              <a:spcBef>
+                <a:spcPct val="20000"/>
+              </a:spcBef>
+              <a:buClr>
+                <a:schemeClr val="accent1"/>
+              </a:buClr>
+              <a:buChar char="•"/>
+              <a:defRPr kumimoji="0" sz="1800" kern="1200">
+                <a:solidFill>
+                  <a:schemeClr val="tx2"/>
+                </a:solidFill>
+                <a:latin typeface="+mn-lt"/>
+                <a:ea typeface="+mn-ea"/>
+                <a:cs typeface="+mn-cs"/>
+              </a:defRPr>
+            </a:lvl6pPr>
+            <a:lvl7pPr marL="2217475" indent="-201589" algn="l" rtl="0" eaLnBrk="1" latinLnBrk="0" hangingPunct="1">
+              <a:spcBef>
+                <a:spcPct val="20000"/>
+              </a:spcBef>
+              <a:buClr>
+                <a:schemeClr val="accent1">
+                  <a:tint val="60000"/>
+                </a:schemeClr>
+              </a:buClr>
+              <a:buSzPct val="60000"/>
+              <a:buFont typeface="Wingdings"/>
+              <a:buChar char=""/>
+              <a:defRPr kumimoji="0" sz="1500" kern="1200" baseline="0">
+                <a:solidFill>
+                  <a:schemeClr val="tx2"/>
+                </a:solidFill>
+                <a:latin typeface="+mn-lt"/>
+                <a:ea typeface="+mn-ea"/>
+                <a:cs typeface="+mn-cs"/>
+              </a:defRPr>
+            </a:lvl7pPr>
+            <a:lvl8pPr marL="2519858" indent="-201589" algn="l" rtl="0" eaLnBrk="1" latinLnBrk="0" hangingPunct="1">
+              <a:spcBef>
+                <a:spcPct val="20000"/>
+              </a:spcBef>
+              <a:buClr>
+                <a:schemeClr val="accent2"/>
+              </a:buClr>
+              <a:buChar char="•"/>
+              <a:defRPr kumimoji="0" sz="1500" kern="1200" cap="small" baseline="0">
+                <a:solidFill>
+                  <a:schemeClr val="tx2"/>
+                </a:solidFill>
+                <a:latin typeface="+mn-lt"/>
+                <a:ea typeface="+mn-ea"/>
+                <a:cs typeface="+mn-cs"/>
+              </a:defRPr>
+            </a:lvl8pPr>
+            <a:lvl9pPr marL="2822241" indent="-201589" algn="l" rtl="0" eaLnBrk="1" latinLnBrk="0" hangingPunct="1">
+              <a:spcBef>
+                <a:spcPct val="20000"/>
+              </a:spcBef>
+              <a:buClr>
+                <a:schemeClr val="accent1">
+                  <a:shade val="75000"/>
+                </a:schemeClr>
+              </a:buClr>
+              <a:buChar char="•"/>
+              <a:defRPr kumimoji="0" sz="1500" kern="1200" baseline="0">
+                <a:solidFill>
+                  <a:schemeClr val="tx2"/>
+                </a:solidFill>
+                <a:latin typeface="+mn-lt"/>
+                <a:ea typeface="+mn-ea"/>
+                <a:cs typeface="+mn-cs"/>
+              </a:defRPr>
+            </a:lvl9pPr>
+          </a:lstStyle>
+          <a:p>
+            <a:r>
+              <a:rPr lang="fr-FR" dirty="0" smtClean="0"/>
+              <a:t>Ordre d’affichage</a:t>
+            </a:r>
+            <a:endParaRPr lang="fr-FR" dirty="0"/>
+          </a:p>
+        </p:txBody>
+      </p:sp>
+      <p:sp>
+        <p:nvSpPr>
+          <p:cNvPr id="10" name="Espace réservé du contenu 2"/>
+          <p:cNvSpPr txBox="1">
+            <a:spLocks/>
+          </p:cNvSpPr>
+          <p:nvPr/>
+        </p:nvSpPr>
+        <p:spPr>
+          <a:xfrm>
+            <a:off x="504030" y="3125449"/>
+            <a:ext cx="4392265" cy="1159208"/>
+          </a:xfrm>
+          <a:prstGeom prst="rect">
+            <a:avLst/>
+          </a:prstGeom>
+        </p:spPr>
+        <p:txBody>
+          <a:bodyPr vert="horz" lIns="100794" tIns="50397" rIns="100794" bIns="50397">
+            <a:normAutofit/>
+          </a:bodyPr>
+          <a:lstStyle>
+            <a:lvl1pPr marL="302383" indent="-302383" algn="l" rtl="0" eaLnBrk="1" latinLnBrk="0" hangingPunct="1">
+              <a:spcBef>
+                <a:spcPts val="661"/>
+              </a:spcBef>
+              <a:buClr>
+                <a:schemeClr val="accent1"/>
+              </a:buClr>
+              <a:buSzPct val="70000"/>
+              <a:buFont typeface="Wingdings"/>
+              <a:buChar char=""/>
+              <a:defRPr kumimoji="0" sz="2600" kern="1200">
+                <a:solidFill>
+                  <a:schemeClr val="tx1"/>
+                </a:solidFill>
+                <a:latin typeface="+mn-lt"/>
+                <a:ea typeface="+mn-ea"/>
+                <a:cs typeface="+mn-cs"/>
+              </a:defRPr>
+            </a:lvl1pPr>
+            <a:lvl2pPr marL="705560" indent="-302383" algn="l" rtl="0" eaLnBrk="1" latinLnBrk="0" hangingPunct="1">
+              <a:spcBef>
+                <a:spcPct val="20000"/>
+              </a:spcBef>
+              <a:buClr>
+                <a:schemeClr val="accent1"/>
+              </a:buClr>
+              <a:buSzPct val="80000"/>
+              <a:buFont typeface="Wingdings 2"/>
+              <a:buChar char=""/>
+              <a:defRPr kumimoji="0" sz="2300" kern="1200">
+                <a:solidFill>
+                  <a:schemeClr val="tx1"/>
+                </a:solidFill>
+                <a:latin typeface="+mn-lt"/>
+                <a:ea typeface="+mn-ea"/>
+                <a:cs typeface="+mn-cs"/>
+              </a:defRPr>
+            </a:lvl2pPr>
+            <a:lvl3pPr marL="1007943" indent="-201589" algn="l" rtl="0" eaLnBrk="1" latinLnBrk="0" hangingPunct="1">
+              <a:spcBef>
+                <a:spcPct val="20000"/>
+              </a:spcBef>
+              <a:buClr>
+                <a:schemeClr val="accent1">
+                  <a:shade val="75000"/>
+                </a:schemeClr>
+              </a:buClr>
+              <a:buSzPct val="60000"/>
+              <a:buFont typeface="Wingdings"/>
+              <a:buChar char=""/>
+              <a:defRPr kumimoji="0" sz="2000" kern="1200">
+                <a:solidFill>
+                  <a:schemeClr val="tx1"/>
+                </a:solidFill>
+                <a:latin typeface="+mn-lt"/>
+                <a:ea typeface="+mn-ea"/>
+                <a:cs typeface="+mn-cs"/>
+              </a:defRPr>
+            </a:lvl3pPr>
+            <a:lvl4pPr marL="1310326" indent="-201589" algn="l" rtl="0" eaLnBrk="1" latinLnBrk="0" hangingPunct="1">
+              <a:spcBef>
+                <a:spcPct val="20000"/>
+              </a:spcBef>
+              <a:buClr>
+                <a:schemeClr val="accent1">
+                  <a:tint val="60000"/>
+                </a:schemeClr>
+              </a:buClr>
+              <a:buSzPct val="60000"/>
+              <a:buFont typeface="Wingdings"/>
+              <a:buChar char=""/>
+              <a:defRPr kumimoji="0" sz="2000" kern="1200">
+                <a:solidFill>
+                  <a:schemeClr val="tx1"/>
+                </a:solidFill>
+                <a:latin typeface="+mn-lt"/>
+                <a:ea typeface="+mn-ea"/>
+                <a:cs typeface="+mn-cs"/>
+              </a:defRPr>
+            </a:lvl4pPr>
+            <a:lvl5pPr marL="1612709" indent="-201589" algn="l" rtl="0" eaLnBrk="1" latinLnBrk="0" hangingPunct="1">
+              <a:spcBef>
+                <a:spcPct val="20000"/>
+              </a:spcBef>
+              <a:buClr>
+                <a:schemeClr val="accent2">
+                  <a:tint val="60000"/>
+                </a:schemeClr>
+              </a:buClr>
+              <a:buSzPct val="68000"/>
+              <a:buFont typeface="Wingdings 2"/>
+              <a:buChar char=""/>
+              <a:defRPr kumimoji="0" sz="1800" kern="1200">
+                <a:solidFill>
+                  <a:schemeClr val="tx1"/>
+                </a:solidFill>
+                <a:latin typeface="+mn-lt"/>
+                <a:ea typeface="+mn-ea"/>
+                <a:cs typeface="+mn-cs"/>
+              </a:defRPr>
+            </a:lvl5pPr>
+            <a:lvl6pPr marL="1915092" indent="-201589" algn="l" rtl="0" eaLnBrk="1" latinLnBrk="0" hangingPunct="1">
+              <a:spcBef>
+                <a:spcPct val="20000"/>
+              </a:spcBef>
+              <a:buClr>
+                <a:schemeClr val="accent1"/>
+              </a:buClr>
+              <a:buChar char="•"/>
+              <a:defRPr kumimoji="0" sz="1800" kern="1200">
+                <a:solidFill>
+                  <a:schemeClr val="tx2"/>
+                </a:solidFill>
+                <a:latin typeface="+mn-lt"/>
+                <a:ea typeface="+mn-ea"/>
+                <a:cs typeface="+mn-cs"/>
+              </a:defRPr>
+            </a:lvl6pPr>
+            <a:lvl7pPr marL="2217475" indent="-201589" algn="l" rtl="0" eaLnBrk="1" latinLnBrk="0" hangingPunct="1">
+              <a:spcBef>
+                <a:spcPct val="20000"/>
+              </a:spcBef>
+              <a:buClr>
+                <a:schemeClr val="accent1">
+                  <a:tint val="60000"/>
+                </a:schemeClr>
+              </a:buClr>
+              <a:buSzPct val="60000"/>
+              <a:buFont typeface="Wingdings"/>
+              <a:buChar char=""/>
+              <a:defRPr kumimoji="0" sz="1500" kern="1200" baseline="0">
+                <a:solidFill>
+                  <a:schemeClr val="tx2"/>
+                </a:solidFill>
+                <a:latin typeface="+mn-lt"/>
+                <a:ea typeface="+mn-ea"/>
+                <a:cs typeface="+mn-cs"/>
+              </a:defRPr>
+            </a:lvl7pPr>
+            <a:lvl8pPr marL="2519858" indent="-201589" algn="l" rtl="0" eaLnBrk="1" latinLnBrk="0" hangingPunct="1">
+              <a:spcBef>
+                <a:spcPct val="20000"/>
+              </a:spcBef>
+              <a:buClr>
+                <a:schemeClr val="accent2"/>
+              </a:buClr>
+              <a:buChar char="•"/>
+              <a:defRPr kumimoji="0" sz="1500" kern="1200" cap="small" baseline="0">
+                <a:solidFill>
+                  <a:schemeClr val="tx2"/>
+                </a:solidFill>
+                <a:latin typeface="+mn-lt"/>
+                <a:ea typeface="+mn-ea"/>
+                <a:cs typeface="+mn-cs"/>
+              </a:defRPr>
+            </a:lvl8pPr>
+            <a:lvl9pPr marL="2822241" indent="-201589" algn="l" rtl="0" eaLnBrk="1" latinLnBrk="0" hangingPunct="1">
+              <a:spcBef>
+                <a:spcPct val="20000"/>
+              </a:spcBef>
+              <a:buClr>
+                <a:schemeClr val="accent1">
+                  <a:shade val="75000"/>
+                </a:schemeClr>
+              </a:buClr>
+              <a:buChar char="•"/>
+              <a:defRPr kumimoji="0" sz="1500" kern="1200" baseline="0">
+                <a:solidFill>
+                  <a:schemeClr val="tx2"/>
+                </a:solidFill>
+                <a:latin typeface="+mn-lt"/>
+                <a:ea typeface="+mn-ea"/>
+                <a:cs typeface="+mn-cs"/>
+              </a:defRPr>
+            </a:lvl9pPr>
+          </a:lstStyle>
+          <a:p>
+            <a:r>
+              <a:rPr lang="fr-FR" dirty="0" smtClean="0"/>
+              <a:t>Modèle de donnée</a:t>
+            </a:r>
+          </a:p>
+          <a:p>
+            <a:r>
+              <a:rPr lang="fr-FR" dirty="0"/>
+              <a:t>C</a:t>
+            </a:r>
+            <a:r>
+              <a:rPr lang="fr-FR" dirty="0" smtClean="0"/>
+              <a:t>alculs</a:t>
+            </a:r>
+            <a:endParaRPr lang="fr-FR" dirty="0"/>
+          </a:p>
+        </p:txBody>
+      </p:sp>
+      <p:sp>
+        <p:nvSpPr>
+          <p:cNvPr id="11" name="Espace réservé du contenu 2"/>
+          <p:cNvSpPr txBox="1">
+            <a:spLocks/>
+          </p:cNvSpPr>
+          <p:nvPr/>
+        </p:nvSpPr>
+        <p:spPr>
+          <a:xfrm>
+            <a:off x="504030" y="4571925"/>
+            <a:ext cx="4392265" cy="1008112"/>
+          </a:xfrm>
+          <a:prstGeom prst="rect">
+            <a:avLst/>
+          </a:prstGeom>
+        </p:spPr>
+        <p:txBody>
+          <a:bodyPr vert="horz" lIns="100794" tIns="50397" rIns="100794" bIns="50397">
+            <a:normAutofit/>
+          </a:bodyPr>
+          <a:lstStyle>
+            <a:lvl1pPr marL="302383" indent="-302383" algn="l" rtl="0" eaLnBrk="1" latinLnBrk="0" hangingPunct="1">
+              <a:spcBef>
+                <a:spcPts val="661"/>
+              </a:spcBef>
+              <a:buClr>
+                <a:schemeClr val="accent1"/>
+              </a:buClr>
+              <a:buSzPct val="70000"/>
+              <a:buFont typeface="Wingdings"/>
+              <a:buChar char=""/>
+              <a:defRPr kumimoji="0" sz="2600" kern="1200">
+                <a:solidFill>
+                  <a:schemeClr val="tx1"/>
+                </a:solidFill>
+                <a:latin typeface="+mn-lt"/>
+                <a:ea typeface="+mn-ea"/>
+                <a:cs typeface="+mn-cs"/>
+              </a:defRPr>
+            </a:lvl1pPr>
+            <a:lvl2pPr marL="705560" indent="-302383" algn="l" rtl="0" eaLnBrk="1" latinLnBrk="0" hangingPunct="1">
+              <a:spcBef>
+                <a:spcPct val="20000"/>
+              </a:spcBef>
+              <a:buClr>
+                <a:schemeClr val="accent1"/>
+              </a:buClr>
+              <a:buSzPct val="80000"/>
+              <a:buFont typeface="Wingdings 2"/>
+              <a:buChar char=""/>
+              <a:defRPr kumimoji="0" sz="2300" kern="1200">
+                <a:solidFill>
+                  <a:schemeClr val="tx1"/>
+                </a:solidFill>
+                <a:latin typeface="+mn-lt"/>
+                <a:ea typeface="+mn-ea"/>
+                <a:cs typeface="+mn-cs"/>
+              </a:defRPr>
+            </a:lvl2pPr>
+            <a:lvl3pPr marL="1007943" indent="-201589" algn="l" rtl="0" eaLnBrk="1" latinLnBrk="0" hangingPunct="1">
+              <a:spcBef>
+                <a:spcPct val="20000"/>
+              </a:spcBef>
+              <a:buClr>
+                <a:schemeClr val="accent1">
+                  <a:shade val="75000"/>
+                </a:schemeClr>
+              </a:buClr>
+              <a:buSzPct val="60000"/>
+              <a:buFont typeface="Wingdings"/>
+              <a:buChar char=""/>
+              <a:defRPr kumimoji="0" sz="2000" kern="1200">
+                <a:solidFill>
+                  <a:schemeClr val="tx1"/>
+                </a:solidFill>
+                <a:latin typeface="+mn-lt"/>
+                <a:ea typeface="+mn-ea"/>
+                <a:cs typeface="+mn-cs"/>
+              </a:defRPr>
+            </a:lvl3pPr>
+            <a:lvl4pPr marL="1310326" indent="-201589" algn="l" rtl="0" eaLnBrk="1" latinLnBrk="0" hangingPunct="1">
+              <a:spcBef>
+                <a:spcPct val="20000"/>
+              </a:spcBef>
+              <a:buClr>
+                <a:schemeClr val="accent1">
+                  <a:tint val="60000"/>
+                </a:schemeClr>
+              </a:buClr>
+              <a:buSzPct val="60000"/>
+              <a:buFont typeface="Wingdings"/>
+              <a:buChar char=""/>
+              <a:defRPr kumimoji="0" sz="2000" kern="1200">
+                <a:solidFill>
+                  <a:schemeClr val="tx1"/>
+                </a:solidFill>
+                <a:latin typeface="+mn-lt"/>
+                <a:ea typeface="+mn-ea"/>
+                <a:cs typeface="+mn-cs"/>
+              </a:defRPr>
+            </a:lvl4pPr>
+            <a:lvl5pPr marL="1612709" indent="-201589" algn="l" rtl="0" eaLnBrk="1" latinLnBrk="0" hangingPunct="1">
+              <a:spcBef>
+                <a:spcPct val="20000"/>
+              </a:spcBef>
+              <a:buClr>
+                <a:schemeClr val="accent2">
+                  <a:tint val="60000"/>
+                </a:schemeClr>
+              </a:buClr>
+              <a:buSzPct val="68000"/>
+              <a:buFont typeface="Wingdings 2"/>
+              <a:buChar char=""/>
+              <a:defRPr kumimoji="0" sz="1800" kern="1200">
+                <a:solidFill>
+                  <a:schemeClr val="tx1"/>
+                </a:solidFill>
+                <a:latin typeface="+mn-lt"/>
+                <a:ea typeface="+mn-ea"/>
+                <a:cs typeface="+mn-cs"/>
+              </a:defRPr>
+            </a:lvl5pPr>
+            <a:lvl6pPr marL="1915092" indent="-201589" algn="l" rtl="0" eaLnBrk="1" latinLnBrk="0" hangingPunct="1">
+              <a:spcBef>
+                <a:spcPct val="20000"/>
+              </a:spcBef>
+              <a:buClr>
+                <a:schemeClr val="accent1"/>
+              </a:buClr>
+              <a:buChar char="•"/>
+              <a:defRPr kumimoji="0" sz="1800" kern="1200">
+                <a:solidFill>
+                  <a:schemeClr val="tx2"/>
+                </a:solidFill>
+                <a:latin typeface="+mn-lt"/>
+                <a:ea typeface="+mn-ea"/>
+                <a:cs typeface="+mn-cs"/>
+              </a:defRPr>
+            </a:lvl6pPr>
+            <a:lvl7pPr marL="2217475" indent="-201589" algn="l" rtl="0" eaLnBrk="1" latinLnBrk="0" hangingPunct="1">
+              <a:spcBef>
+                <a:spcPct val="20000"/>
+              </a:spcBef>
+              <a:buClr>
+                <a:schemeClr val="accent1">
+                  <a:tint val="60000"/>
+                </a:schemeClr>
+              </a:buClr>
+              <a:buSzPct val="60000"/>
+              <a:buFont typeface="Wingdings"/>
+              <a:buChar char=""/>
+              <a:defRPr kumimoji="0" sz="1500" kern="1200" baseline="0">
+                <a:solidFill>
+                  <a:schemeClr val="tx2"/>
+                </a:solidFill>
+                <a:latin typeface="+mn-lt"/>
+                <a:ea typeface="+mn-ea"/>
+                <a:cs typeface="+mn-cs"/>
+              </a:defRPr>
+            </a:lvl7pPr>
+            <a:lvl8pPr marL="2519858" indent="-201589" algn="l" rtl="0" eaLnBrk="1" latinLnBrk="0" hangingPunct="1">
+              <a:spcBef>
+                <a:spcPct val="20000"/>
+              </a:spcBef>
+              <a:buClr>
+                <a:schemeClr val="accent2"/>
+              </a:buClr>
+              <a:buChar char="•"/>
+              <a:defRPr kumimoji="0" sz="1500" kern="1200" cap="small" baseline="0">
+                <a:solidFill>
+                  <a:schemeClr val="tx2"/>
+                </a:solidFill>
+                <a:latin typeface="+mn-lt"/>
+                <a:ea typeface="+mn-ea"/>
+                <a:cs typeface="+mn-cs"/>
+              </a:defRPr>
+            </a:lvl8pPr>
+            <a:lvl9pPr marL="2822241" indent="-201589" algn="l" rtl="0" eaLnBrk="1" latinLnBrk="0" hangingPunct="1">
+              <a:spcBef>
+                <a:spcPct val="20000"/>
+              </a:spcBef>
+              <a:buClr>
+                <a:schemeClr val="accent1">
+                  <a:shade val="75000"/>
+                </a:schemeClr>
+              </a:buClr>
+              <a:buChar char="•"/>
+              <a:defRPr kumimoji="0" sz="1500" kern="1200" baseline="0">
+                <a:solidFill>
+                  <a:schemeClr val="tx2"/>
+                </a:solidFill>
+                <a:latin typeface="+mn-lt"/>
+                <a:ea typeface="+mn-ea"/>
+                <a:cs typeface="+mn-cs"/>
+              </a:defRPr>
+            </a:lvl9pPr>
+          </a:lstStyle>
+          <a:p>
+            <a:r>
+              <a:rPr lang="fr-FR" dirty="0" smtClean="0"/>
+              <a:t>Interface graphique</a:t>
+            </a:r>
+          </a:p>
+          <a:p>
+            <a:r>
+              <a:rPr lang="fr-FR" dirty="0" smtClean="0"/>
+              <a:t>Pointeurs vers d</a:t>
+            </a:r>
+            <a:r>
+              <a:rPr lang="fr-FR" dirty="0" smtClean="0"/>
+              <a:t>onnée</a:t>
+            </a:r>
+            <a:endParaRPr lang="fr-FR" dirty="0"/>
+          </a:p>
+        </p:txBody>
+      </p:sp>
+      <p:sp>
+        <p:nvSpPr>
+          <p:cNvPr id="12" name="Espace réservé du contenu 2"/>
+          <p:cNvSpPr txBox="1">
+            <a:spLocks/>
+          </p:cNvSpPr>
+          <p:nvPr/>
+        </p:nvSpPr>
+        <p:spPr>
+          <a:xfrm>
+            <a:off x="535285" y="6223133"/>
+            <a:ext cx="4392265" cy="508267"/>
+          </a:xfrm>
+          <a:prstGeom prst="rect">
+            <a:avLst/>
+          </a:prstGeom>
+        </p:spPr>
+        <p:txBody>
+          <a:bodyPr vert="horz" lIns="100794" tIns="50397" rIns="100794" bIns="50397">
+            <a:normAutofit/>
+          </a:bodyPr>
+          <a:lstStyle>
+            <a:lvl1pPr marL="302383" indent="-302383" algn="l" rtl="0" eaLnBrk="1" latinLnBrk="0" hangingPunct="1">
+              <a:spcBef>
+                <a:spcPts val="661"/>
+              </a:spcBef>
+              <a:buClr>
+                <a:schemeClr val="accent1"/>
+              </a:buClr>
+              <a:buSzPct val="70000"/>
+              <a:buFont typeface="Wingdings"/>
+              <a:buChar char=""/>
+              <a:defRPr kumimoji="0" sz="2600" kern="1200">
+                <a:solidFill>
+                  <a:schemeClr val="tx1"/>
+                </a:solidFill>
+                <a:latin typeface="+mn-lt"/>
+                <a:ea typeface="+mn-ea"/>
+                <a:cs typeface="+mn-cs"/>
+              </a:defRPr>
+            </a:lvl1pPr>
+            <a:lvl2pPr marL="705560" indent="-302383" algn="l" rtl="0" eaLnBrk="1" latinLnBrk="0" hangingPunct="1">
+              <a:spcBef>
+                <a:spcPct val="20000"/>
+              </a:spcBef>
+              <a:buClr>
+                <a:schemeClr val="accent1"/>
+              </a:buClr>
+              <a:buSzPct val="80000"/>
+              <a:buFont typeface="Wingdings 2"/>
+              <a:buChar char=""/>
+              <a:defRPr kumimoji="0" sz="2300" kern="1200">
+                <a:solidFill>
+                  <a:schemeClr val="tx1"/>
+                </a:solidFill>
+                <a:latin typeface="+mn-lt"/>
+                <a:ea typeface="+mn-ea"/>
+                <a:cs typeface="+mn-cs"/>
+              </a:defRPr>
+            </a:lvl2pPr>
+            <a:lvl3pPr marL="1007943" indent="-201589" algn="l" rtl="0" eaLnBrk="1" latinLnBrk="0" hangingPunct="1">
+              <a:spcBef>
+                <a:spcPct val="20000"/>
+              </a:spcBef>
+              <a:buClr>
+                <a:schemeClr val="accent1">
+                  <a:shade val="75000"/>
+                </a:schemeClr>
+              </a:buClr>
+              <a:buSzPct val="60000"/>
+              <a:buFont typeface="Wingdings"/>
+              <a:buChar char=""/>
+              <a:defRPr kumimoji="0" sz="2000" kern="1200">
+                <a:solidFill>
+                  <a:schemeClr val="tx1"/>
+                </a:solidFill>
+                <a:latin typeface="+mn-lt"/>
+                <a:ea typeface="+mn-ea"/>
+                <a:cs typeface="+mn-cs"/>
+              </a:defRPr>
+            </a:lvl3pPr>
+            <a:lvl4pPr marL="1310326" indent="-201589" algn="l" rtl="0" eaLnBrk="1" latinLnBrk="0" hangingPunct="1">
+              <a:spcBef>
+                <a:spcPct val="20000"/>
+              </a:spcBef>
+              <a:buClr>
+                <a:schemeClr val="accent1">
+                  <a:tint val="60000"/>
+                </a:schemeClr>
+              </a:buClr>
+              <a:buSzPct val="60000"/>
+              <a:buFont typeface="Wingdings"/>
+              <a:buChar char=""/>
+              <a:defRPr kumimoji="0" sz="2000" kern="1200">
+                <a:solidFill>
+                  <a:schemeClr val="tx1"/>
+                </a:solidFill>
+                <a:latin typeface="+mn-lt"/>
+                <a:ea typeface="+mn-ea"/>
+                <a:cs typeface="+mn-cs"/>
+              </a:defRPr>
+            </a:lvl4pPr>
+            <a:lvl5pPr marL="1612709" indent="-201589" algn="l" rtl="0" eaLnBrk="1" latinLnBrk="0" hangingPunct="1">
+              <a:spcBef>
+                <a:spcPct val="20000"/>
+              </a:spcBef>
+              <a:buClr>
+                <a:schemeClr val="accent2">
+                  <a:tint val="60000"/>
+                </a:schemeClr>
+              </a:buClr>
+              <a:buSzPct val="68000"/>
+              <a:buFont typeface="Wingdings 2"/>
+              <a:buChar char=""/>
+              <a:defRPr kumimoji="0" sz="1800" kern="1200">
+                <a:solidFill>
+                  <a:schemeClr val="tx1"/>
+                </a:solidFill>
+                <a:latin typeface="+mn-lt"/>
+                <a:ea typeface="+mn-ea"/>
+                <a:cs typeface="+mn-cs"/>
+              </a:defRPr>
+            </a:lvl5pPr>
+            <a:lvl6pPr marL="1915092" indent="-201589" algn="l" rtl="0" eaLnBrk="1" latinLnBrk="0" hangingPunct="1">
+              <a:spcBef>
+                <a:spcPct val="20000"/>
+              </a:spcBef>
+              <a:buClr>
+                <a:schemeClr val="accent1"/>
+              </a:buClr>
+              <a:buChar char="•"/>
+              <a:defRPr kumimoji="0" sz="1800" kern="1200">
+                <a:solidFill>
+                  <a:schemeClr val="tx2"/>
+                </a:solidFill>
+                <a:latin typeface="+mn-lt"/>
+                <a:ea typeface="+mn-ea"/>
+                <a:cs typeface="+mn-cs"/>
+              </a:defRPr>
+            </a:lvl6pPr>
+            <a:lvl7pPr marL="2217475" indent="-201589" algn="l" rtl="0" eaLnBrk="1" latinLnBrk="0" hangingPunct="1">
+              <a:spcBef>
+                <a:spcPct val="20000"/>
+              </a:spcBef>
+              <a:buClr>
+                <a:schemeClr val="accent1">
+                  <a:tint val="60000"/>
+                </a:schemeClr>
+              </a:buClr>
+              <a:buSzPct val="60000"/>
+              <a:buFont typeface="Wingdings"/>
+              <a:buChar char=""/>
+              <a:defRPr kumimoji="0" sz="1500" kern="1200" baseline="0">
+                <a:solidFill>
+                  <a:schemeClr val="tx2"/>
+                </a:solidFill>
+                <a:latin typeface="+mn-lt"/>
+                <a:ea typeface="+mn-ea"/>
+                <a:cs typeface="+mn-cs"/>
+              </a:defRPr>
+            </a:lvl7pPr>
+            <a:lvl8pPr marL="2519858" indent="-201589" algn="l" rtl="0" eaLnBrk="1" latinLnBrk="0" hangingPunct="1">
+              <a:spcBef>
+                <a:spcPct val="20000"/>
+              </a:spcBef>
+              <a:buClr>
+                <a:schemeClr val="accent2"/>
+              </a:buClr>
+              <a:buChar char="•"/>
+              <a:defRPr kumimoji="0" sz="1500" kern="1200" cap="small" baseline="0">
+                <a:solidFill>
+                  <a:schemeClr val="tx2"/>
+                </a:solidFill>
+                <a:latin typeface="+mn-lt"/>
+                <a:ea typeface="+mn-ea"/>
+                <a:cs typeface="+mn-cs"/>
+              </a:defRPr>
+            </a:lvl8pPr>
+            <a:lvl9pPr marL="2822241" indent="-201589" algn="l" rtl="0" eaLnBrk="1" latinLnBrk="0" hangingPunct="1">
+              <a:spcBef>
+                <a:spcPct val="20000"/>
+              </a:spcBef>
+              <a:buClr>
+                <a:schemeClr val="accent1">
+                  <a:shade val="75000"/>
+                </a:schemeClr>
+              </a:buClr>
+              <a:buChar char="•"/>
+              <a:defRPr kumimoji="0" sz="1500" kern="1200" baseline="0">
+                <a:solidFill>
+                  <a:schemeClr val="tx2"/>
+                </a:solidFill>
+                <a:latin typeface="+mn-lt"/>
+                <a:ea typeface="+mn-ea"/>
+                <a:cs typeface="+mn-cs"/>
+              </a:defRPr>
+            </a:lvl9pPr>
+          </a:lstStyle>
+          <a:p>
+            <a:r>
+              <a:rPr lang="fr-FR" dirty="0" smtClean="0"/>
+              <a:t>Zone</a:t>
+            </a:r>
+            <a:r>
+              <a:rPr lang="fr-FR" dirty="0" smtClean="0"/>
+              <a:t> d’affichage</a:t>
+            </a:r>
+            <a:endParaRPr lang="fr-FR" dirty="0"/>
           </a:p>
         </p:txBody>
       </p:sp>
@@ -6318,7 +7180,6 @@
               <a:rPr lang="fr-FR" dirty="0" smtClean="0"/>
               <a:t>)</a:t>
             </a:r>
-            <a:endParaRPr lang="fr-FR" dirty="0" smtClean="0"/>
           </a:p>
           <a:p>
             <a:r>

</xml_diff>

<commit_message>
last version from clementine (presentation)+sprints.xlsx
</commit_message>
<xml_diff>
--- a/doc/presentation.pptx
+++ b/doc/presentation.pptx
@@ -20,10 +20,10 @@
     <p:sldId id="269" r:id="rId11"/>
     <p:sldId id="270" r:id="rId12"/>
     <p:sldId id="271" r:id="rId13"/>
-    <p:sldId id="257" r:id="rId14"/>
-    <p:sldId id="258" r:id="rId15"/>
-    <p:sldId id="259" r:id="rId16"/>
-    <p:sldId id="260" r:id="rId17"/>
+    <p:sldId id="272" r:id="rId14"/>
+    <p:sldId id="273" r:id="rId15"/>
+    <p:sldId id="274" r:id="rId16"/>
+    <p:sldId id="275" r:id="rId17"/>
   </p:sldIdLst>
   <p:sldSz cx="10080625" cy="7559675"/>
   <p:notesSz cx="7559675" cy="10691813"/>
@@ -124,7 +124,7 @@
   </p:defaultTextStyle>
   <p:extLst>
     <p:ext uri="{EFAFB233-063F-42B5-8137-9DF3F51BA10A}">
-      <p15:sldGuideLst xmlns:p15="http://schemas.microsoft.com/office/powerpoint/2012/main">
+      <p15:sldGuideLst xmlns:p15="http://schemas.microsoft.com/office/powerpoint/2012/main" xmlns="">
         <p15:guide id="1" orient="horz" pos="2381">
           <p15:clr>
             <a:srgbClr val="A4A3A4"/>
@@ -223,7 +223,7 @@
           <a:p>
             <a:fld id="{D6CDC2E4-580B-4A4C-AEF3-6D60A3D71BED}" type="datetimeFigureOut">
               <a:rPr lang="fr-FR" smtClean="0"/>
-              <a:t>03/12/2015</a:t>
+              <a:t>03/12/15</a:t>
             </a:fld>
             <a:endParaRPr lang="fr-FR"/>
           </a:p>
@@ -382,7 +382,7 @@
           <a:p>
             <a:fld id="{074ADA82-E56B-44EB-B4BD-81230549B593}" type="slidenum">
               <a:rPr lang="fr-FR" smtClean="0"/>
-              <a:t>‹N°›</a:t>
+              <a:t>‹#›</a:t>
             </a:fld>
             <a:endParaRPr lang="fr-FR"/>
           </a:p>
@@ -1497,7 +1497,7 @@
             <a:pPr algn="r"/>
             <a:fld id="{1B89F8F7-7F43-456E-BDE3-F05AE4A5EC3B}" type="slidenum">
               <a:rPr lang="fr-FR" sz="1400" smtClean="0"/>
-              <a:t>‹N°›</a:t>
+              <a:t>‹#›</a:t>
             </a:fld>
             <a:endParaRPr lang="fr-FR"/>
           </a:p>
@@ -1511,7 +1511,7 @@
   <p:timing>
     <p:tnLst>
       <p:par>
-        <p:cTn id="1" dur="indefinite" restart="never" nodeType="tmRoot"/>
+        <p:cTn xmlns:p14="http://schemas.microsoft.com/office/powerpoint/2010/main" id="1" dur="indefinite" restart="never" nodeType="tmRoot"/>
       </p:par>
     </p:tnLst>
   </p:timing>
@@ -1675,7 +1675,7 @@
             <a:pPr algn="r"/>
             <a:fld id="{1B89F8F7-7F43-456E-BDE3-F05AE4A5EC3B}" type="slidenum">
               <a:rPr lang="fr-FR" sz="1400" smtClean="0"/>
-              <a:t>‹N°›</a:t>
+              <a:t>‹#›</a:t>
             </a:fld>
             <a:endParaRPr lang="fr-FR"/>
           </a:p>
@@ -1856,7 +1856,7 @@
             <a:pPr algn="r"/>
             <a:fld id="{1B89F8F7-7F43-456E-BDE3-F05AE4A5EC3B}" type="slidenum">
               <a:rPr lang="fr-FR" sz="1400" smtClean="0"/>
-              <a:t>‹N°›</a:t>
+              <a:t>‹#›</a:t>
             </a:fld>
             <a:endParaRPr lang="fr-FR"/>
           </a:p>
@@ -2195,7 +2195,7 @@
             <a:fld id="{1B89F8F7-7F43-456E-BDE3-F05AE4A5EC3B}" type="slidenum">
               <a:rPr lang="fr-FR" sz="1400" smtClean="0"/>
               <a:pPr algn="r"/>
-              <a:t>‹N°›</a:t>
+              <a:t>‹#›</a:t>
             </a:fld>
             <a:endParaRPr lang="fr-FR" dirty="0"/>
           </a:p>
@@ -2209,7 +2209,7 @@
   <p:timing>
     <p:tnLst>
       <p:par>
-        <p:cTn id="1" dur="indefinite" restart="never" nodeType="tmRoot"/>
+        <p:cTn xmlns:p14="http://schemas.microsoft.com/office/powerpoint/2010/main" id="1" dur="indefinite" restart="never" nodeType="tmRoot"/>
       </p:par>
     </p:tnLst>
   </p:timing>
@@ -3119,7 +3119,7 @@
             <a:pPr algn="r"/>
             <a:fld id="{1B89F8F7-7F43-456E-BDE3-F05AE4A5EC3B}" type="slidenum">
               <a:rPr lang="fr-FR" sz="1400" smtClean="0"/>
-              <a:t>‹N°›</a:t>
+              <a:t>‹#›</a:t>
             </a:fld>
             <a:endParaRPr lang="fr-FR"/>
           </a:p>
@@ -3133,7 +3133,7 @@
   <p:timing>
     <p:tnLst>
       <p:par>
-        <p:cTn id="1" dur="indefinite" restart="never" nodeType="tmRoot"/>
+        <p:cTn xmlns:p14="http://schemas.microsoft.com/office/powerpoint/2010/main" id="1" dur="indefinite" restart="never" nodeType="tmRoot"/>
       </p:par>
     </p:tnLst>
   </p:timing>
@@ -3245,7 +3245,7 @@
             <a:pPr algn="r"/>
             <a:fld id="{1B89F8F7-7F43-456E-BDE3-F05AE4A5EC3B}" type="slidenum">
               <a:rPr lang="fr-FR" sz="1400" smtClean="0"/>
-              <a:t>‹N°›</a:t>
+              <a:t>‹#›</a:t>
             </a:fld>
             <a:endParaRPr lang="fr-FR"/>
           </a:p>
@@ -3487,7 +3487,7 @@
             <a:pPr algn="r"/>
             <a:fld id="{1B89F8F7-7F43-456E-BDE3-F05AE4A5EC3B}" type="slidenum">
               <a:rPr lang="fr-FR" sz="1400" smtClean="0"/>
-              <a:t>‹N°›</a:t>
+              <a:t>‹#›</a:t>
             </a:fld>
             <a:endParaRPr lang="fr-FR"/>
           </a:p>
@@ -3792,7 +3792,7 @@
             <a:pPr algn="r"/>
             <a:fld id="{1B89F8F7-7F43-456E-BDE3-F05AE4A5EC3B}" type="slidenum">
               <a:rPr lang="fr-FR" sz="1400" smtClean="0"/>
-              <a:t>‹N°›</a:t>
+              <a:t>‹#›</a:t>
             </a:fld>
             <a:endParaRPr lang="fr-FR"/>
           </a:p>
@@ -3912,7 +3912,7 @@
             <a:pPr algn="r"/>
             <a:fld id="{1B89F8F7-7F43-456E-BDE3-F05AE4A5EC3B}" type="slidenum">
               <a:rPr lang="fr-FR" sz="1400" smtClean="0"/>
-              <a:t>‹N°›</a:t>
+              <a:t>‹#›</a:t>
             </a:fld>
             <a:endParaRPr lang="fr-FR"/>
           </a:p>
@@ -4411,7 +4411,7 @@
             <a:pPr algn="r"/>
             <a:fld id="{1B89F8F7-7F43-456E-BDE3-F05AE4A5EC3B}" type="slidenum">
               <a:rPr lang="fr-FR" sz="1400" smtClean="0"/>
-              <a:t>‹N°›</a:t>
+              <a:t>‹#›</a:t>
             </a:fld>
             <a:endParaRPr lang="fr-FR"/>
           </a:p>
@@ -4928,7 +4928,7 @@
             <a:pPr algn="r"/>
             <a:fld id="{1B89F8F7-7F43-456E-BDE3-F05AE4A5EC3B}" type="slidenum">
               <a:rPr lang="fr-FR" sz="1400" smtClean="0"/>
-              <a:t>‹N°›</a:t>
+              <a:t>‹#›</a:t>
             </a:fld>
             <a:endParaRPr lang="fr-FR"/>
           </a:p>
@@ -5437,7 +5437,7 @@
             <a:pPr algn="r"/>
             <a:fld id="{FC9B7B7F-25F8-4AFE-9853-08EB6C653BDE}" type="slidenum">
               <a:rPr lang="fr-FR" sz="1400" smtClean="0"/>
-              <a:t>‹N°›</a:t>
+              <a:t>‹#›</a:t>
             </a:fld>
             <a:endParaRPr lang="fr-FR"/>
           </a:p>
@@ -6092,7 +6092,7 @@
   <p:timing>
     <p:tnLst>
       <p:par>
-        <p:cTn id="1" dur="indefinite" restart="never" nodeType="tmRoot">
+        <p:cTn xmlns:p14="http://schemas.microsoft.com/office/powerpoint/2010/main" id="1" dur="indefinite" restart="never" nodeType="tmRoot">
           <p:childTnLst>
             <p:seq>
               <p:cTn id="2" nodeType="mainSeq"/>
@@ -6864,11 +6864,7 @@
           <a:p>
             <a:r>
               <a:rPr lang="fr-FR" dirty="0" smtClean="0"/>
-              <a:t>Pointeurs vers d</a:t>
-            </a:r>
-            <a:r>
-              <a:rPr lang="fr-FR" dirty="0" smtClean="0"/>
-              <a:t>onnée</a:t>
+              <a:t>Pointeurs vers donnée</a:t>
             </a:r>
             <a:endParaRPr lang="fr-FR" dirty="0"/>
           </a:p>
@@ -7075,11 +7071,7 @@
           <a:p>
             <a:r>
               <a:rPr lang="fr-FR" dirty="0" smtClean="0"/>
-              <a:t>Zone</a:t>
-            </a:r>
-            <a:r>
-              <a:rPr lang="fr-FR" dirty="0" smtClean="0"/>
-              <a:t> d’affichage</a:t>
+              <a:t>Zone d’affichage</a:t>
             </a:r>
             <a:endParaRPr lang="fr-FR" dirty="0"/>
           </a:p>
@@ -7098,7 +7090,7 @@
   <p:timing>
     <p:tnLst>
       <p:par>
-        <p:cTn id="1" dur="indefinite" restart="never" nodeType="tmRoot"/>
+        <p:cTn xmlns:p14="http://schemas.microsoft.com/office/powerpoint/2010/main" id="1" dur="indefinite" restart="never" nodeType="tmRoot"/>
       </p:par>
     </p:tnLst>
   </p:timing>
@@ -7280,7 +7272,7 @@
   <p:timing>
     <p:tnLst>
       <p:par>
-        <p:cTn id="1" dur="indefinite" restart="never" nodeType="tmRoot"/>
+        <p:cTn xmlns:p14="http://schemas.microsoft.com/office/powerpoint/2010/main" id="1" dur="indefinite" restart="never" nodeType="tmRoot"/>
       </p:par>
     </p:tnLst>
   </p:timing>
@@ -7359,7 +7351,7 @@
   <p:timing>
     <p:tnLst>
       <p:par>
-        <p:cTn id="1" dur="indefinite" restart="never" nodeType="tmRoot"/>
+        <p:cTn xmlns:p14="http://schemas.microsoft.com/office/powerpoint/2010/main" id="1" dur="indefinite" restart="never" nodeType="tmRoot"/>
       </p:par>
     </p:tnLst>
   </p:timing>
@@ -7476,58 +7468,50 @@
           <a:lstStyle/>
           <a:p>
             <a:pPr>
-              <a:spcBef>
-                <a:spcPts val="1200"/>
-              </a:spcBef>
               <a:spcAft>
                 <a:spcPts val="600"/>
               </a:spcAft>
-              <a:buClr>
-                <a:schemeClr val="tx2"/>
-              </a:buClr>
-              <a:buSzPct val="100000"/>
-              <a:buFont typeface="Wingdings" panose="05000000000000000000" pitchFamily="2" charset="2"/>
-              <a:buChar char="Ø"/>
             </a:pPr>
             <a:r>
               <a:rPr lang="fr-FR" dirty="0" smtClean="0"/>
-              <a:t>méthode SCRUM </a:t>
+              <a:t>Méthode </a:t>
             </a:r>
             <a:r>
               <a:rPr lang="fr-FR" dirty="0"/>
-              <a:t>appliquée à la suite du cours d'Adrien </a:t>
-            </a:r>
-            <a:r>
-              <a:rPr lang="fr-FR" dirty="0" err="1"/>
+              <a:t>SCRUM appliquée à la suite du cours d'Adrien </a:t>
+            </a:r>
+            <a:r>
+              <a:rPr lang="fr-FR" dirty="0" err="1" smtClean="0"/>
               <a:t>Chassard</a:t>
             </a:r>
-            <a:r>
-              <a:rPr lang="fr-FR" dirty="0"/>
-              <a:t>.</a:t>
-            </a:r>
-          </a:p>
-          <a:p>
-            <a:pPr>
-              <a:spcBef>
-                <a:spcPts val="1200"/>
-              </a:spcBef>
+            <a:endParaRPr lang="fr-FR" dirty="0" smtClean="0"/>
+          </a:p>
+          <a:p>
+            <a:pPr marL="0" indent="0">
               <a:spcAft>
                 <a:spcPts val="600"/>
               </a:spcAft>
-              <a:buClr>
-                <a:schemeClr val="tx2"/>
-              </a:buClr>
-              <a:buSzPct val="100000"/>
-              <a:buFont typeface="Wingdings" panose="05000000000000000000" pitchFamily="2" charset="2"/>
-              <a:buChar char="Ø"/>
+              <a:buNone/>
             </a:pPr>
+            <a:endParaRPr lang="fr-FR" dirty="0"/>
+          </a:p>
+          <a:p>
+            <a:pPr>
+              <a:spcAft>
+                <a:spcPts val="600"/>
+              </a:spcAft>
+            </a:pPr>
             <a:r>
               <a:rPr lang="fr-FR" dirty="0" smtClean="0"/>
-              <a:t>lancement </a:t>
+              <a:t>Lancement </a:t>
             </a:r>
             <a:r>
               <a:rPr lang="fr-FR" dirty="0"/>
-              <a:t>du projet : </a:t>
+              <a:t>du </a:t>
+            </a:r>
+            <a:r>
+              <a:rPr lang="fr-FR" dirty="0" smtClean="0"/>
+              <a:t>projet</a:t>
             </a:r>
           </a:p>
           <a:p>
@@ -7536,34 +7520,22 @@
                 <a:schemeClr val="tx2"/>
               </a:buClr>
               <a:buSzPct val="100000"/>
-              <a:buFont typeface="Wingdings" panose="05000000000000000000" pitchFamily="2" charset="2"/>
-              <a:buChar char="Ø"/>
+              <a:buFont typeface="Courier New"/>
+              <a:buChar char="o"/>
             </a:pPr>
             <a:r>
-              <a:rPr lang="fr-FR" dirty="0"/>
-              <a:t>Listage des fonctionnalités : </a:t>
-            </a:r>
-            <a:r>
-              <a:rPr lang="fr-FR" i="1" dirty="0" err="1"/>
-              <a:t>features</a:t>
-            </a:r>
-            <a:r>
-              <a:rPr lang="fr-FR" dirty="0"/>
-              <a:t> + </a:t>
-            </a:r>
-            <a:r>
-              <a:rPr lang="fr-FR" i="1" dirty="0"/>
-              <a:t>user</a:t>
-            </a:r>
-            <a:r>
-              <a:rPr lang="fr-FR" dirty="0"/>
-              <a:t>-</a:t>
-            </a:r>
-            <a:r>
-              <a:rPr lang="fr-FR" i="1" dirty="0"/>
-              <a:t>stories</a:t>
-            </a:r>
-            <a:endParaRPr lang="fr-FR" dirty="0"/>
+              <a:rPr lang="fr-FR" sz="2200" dirty="0" smtClean="0"/>
+              <a:t>Alban </a:t>
+            </a:r>
+            <a:r>
+              <a:rPr lang="fr-FR" sz="2200" dirty="0"/>
+              <a:t>= Product </a:t>
+            </a:r>
+            <a:r>
+              <a:rPr lang="fr-FR" sz="2200" dirty="0" err="1"/>
+              <a:t>Owner</a:t>
+            </a:r>
+            <a:endParaRPr lang="fr-FR" sz="2200" dirty="0"/>
           </a:p>
           <a:p>
             <a:pPr lvl="2">
@@ -7571,21 +7543,18 @@
                 <a:schemeClr val="tx2"/>
               </a:buClr>
               <a:buSzPct val="100000"/>
-              <a:buFont typeface="Wingdings" panose="05000000000000000000" pitchFamily="2" charset="2"/>
-              <a:buChar char="Ø"/>
+              <a:buFont typeface="Courier New"/>
+              <a:buChar char="o"/>
             </a:pPr>
             <a:r>
-              <a:rPr lang="fr-FR" dirty="0"/>
-              <a:t>Attribution du nombre de points (suite de </a:t>
-            </a:r>
-            <a:r>
-              <a:rPr lang="fr-FR" dirty="0" err="1"/>
-              <a:t>Fibonacci</a:t>
-            </a:r>
-            <a:r>
-              <a:rPr lang="fr-FR" dirty="0"/>
-              <a:t>)</a:t>
-            </a:r>
+              <a:rPr lang="fr-FR" sz="2200" dirty="0" smtClean="0"/>
+              <a:t>Listage </a:t>
+            </a:r>
+            <a:r>
+              <a:rPr lang="fr-FR" sz="2200" dirty="0"/>
+              <a:t>des fonctionnalités </a:t>
+            </a:r>
+            <a:endParaRPr lang="fr-FR" sz="2200" dirty="0" smtClean="0"/>
           </a:p>
           <a:p>
             <a:pPr lvl="2">
@@ -7593,13 +7562,22 @@
                 <a:schemeClr val="tx2"/>
               </a:buClr>
               <a:buSzPct val="100000"/>
-              <a:buFont typeface="Wingdings" panose="05000000000000000000" pitchFamily="2" charset="2"/>
-              <a:buChar char="Ø"/>
+              <a:buFont typeface="Courier New"/>
+              <a:buChar char="o"/>
             </a:pPr>
             <a:r>
-              <a:rPr lang="fr-FR" dirty="0"/>
-              <a:t>Attribution d'un ordre prioritaire</a:t>
-            </a:r>
+              <a:rPr lang="fr-FR" sz="2200" dirty="0" smtClean="0"/>
+              <a:t>Attribution </a:t>
+            </a:r>
+            <a:r>
+              <a:rPr lang="fr-FR" sz="2200" dirty="0"/>
+              <a:t>du nombre de </a:t>
+            </a:r>
+            <a:r>
+              <a:rPr lang="fr-FR" sz="2200" dirty="0" smtClean="0"/>
+              <a:t>points</a:t>
+            </a:r>
+            <a:endParaRPr lang="fr-FR" sz="2200" dirty="0"/>
           </a:p>
           <a:p>
             <a:pPr lvl="2">
@@ -7607,17 +7585,51 @@
                 <a:schemeClr val="tx2"/>
               </a:buClr>
               <a:buSzPct val="100000"/>
-              <a:buFont typeface="Wingdings" panose="05000000000000000000" pitchFamily="2" charset="2"/>
-              <a:buChar char="Ø"/>
+              <a:buFont typeface="Courier New"/>
+              <a:buChar char="o"/>
             </a:pPr>
             <a:r>
-              <a:rPr lang="fr-FR" dirty="0"/>
+              <a:rPr lang="fr-FR" sz="2200" dirty="0"/>
+              <a:t>Attribution d'un ordre prioritaire</a:t>
+            </a:r>
+          </a:p>
+          <a:p>
+            <a:pPr lvl="2">
+              <a:buClr>
+                <a:schemeClr val="tx2"/>
+              </a:buClr>
+              <a:buSzPct val="100000"/>
+              <a:buFont typeface="Courier New"/>
+              <a:buChar char="o"/>
+            </a:pPr>
+            <a:r>
+              <a:rPr lang="fr-FR" sz="2200" dirty="0"/>
               <a:t>Définition de 3 sprints sur 20 </a:t>
             </a:r>
             <a:r>
-              <a:rPr lang="fr-FR" dirty="0" smtClean="0"/>
+              <a:rPr lang="fr-FR" sz="2200" dirty="0" smtClean="0"/>
               <a:t>jours</a:t>
             </a:r>
+          </a:p>
+          <a:p>
+            <a:pPr marL="806354" lvl="2" indent="0">
+              <a:buClr>
+                <a:schemeClr val="tx2"/>
+              </a:buClr>
+              <a:buSzPct val="100000"/>
+              <a:buNone/>
+            </a:pPr>
+            <a:endParaRPr lang="fr-FR" sz="2200" dirty="0" smtClean="0"/>
+          </a:p>
+          <a:p>
+            <a:pPr marL="806354" lvl="2" indent="0">
+              <a:buClr>
+                <a:schemeClr val="tx2"/>
+              </a:buClr>
+              <a:buSzPct val="100000"/>
+              <a:buNone/>
+            </a:pPr>
+            <a:endParaRPr lang="fr-FR" sz="2200" dirty="0" smtClean="0"/>
           </a:p>
         </p:txBody>
       </p:sp>
@@ -7660,6 +7672,11 @@
         </p:txBody>
       </p:sp>
     </p:spTree>
+    <p:extLst>
+      <p:ext uri="{BB962C8B-B14F-4D97-AF65-F5344CB8AC3E}">
+        <p14:creationId xmlns:p14="http://schemas.microsoft.com/office/powerpoint/2010/main" val="1678792157"/>
+      </p:ext>
+    </p:extLst>
   </p:cSld>
   <p:clrMapOvr>
     <a:masterClrMapping/>
@@ -7667,7 +7684,7 @@
   <p:timing>
     <p:tnLst>
       <p:par>
-        <p:cTn id="1" dur="indefinite" restart="never" nodeType="tmRoot"/>
+        <p:cTn xmlns:p14="http://schemas.microsoft.com/office/powerpoint/2010/main" id="1" dur="indefinite" restart="never" nodeType="tmRoot"/>
       </p:par>
     </p:tnLst>
   </p:timing>
@@ -7701,31 +7718,28 @@
             <p:ph sz="quarter" idx="1"/>
           </p:nvPr>
         </p:nvSpPr>
-        <p:spPr/>
+        <p:spPr>
+          <a:xfrm>
+            <a:off x="504031" y="1763924"/>
+            <a:ext cx="8232510" cy="5544305"/>
+          </a:xfrm>
+        </p:spPr>
         <p:txBody>
           <a:bodyPr>
-            <a:normAutofit fontScale="77500" lnSpcReduction="20000"/>
+            <a:normAutofit/>
           </a:bodyPr>
           <a:lstStyle/>
           <a:p>
             <a:pPr>
-              <a:spcBef>
-                <a:spcPts val="1200"/>
-              </a:spcBef>
               <a:spcAft>
                 <a:spcPts val="600"/>
               </a:spcAft>
-              <a:buClr>
-                <a:schemeClr val="tx2"/>
-              </a:buClr>
-              <a:buSzPct val="100000"/>
-              <a:buFont typeface="Wingdings" panose="05000000000000000000" pitchFamily="2" charset="2"/>
-              <a:buChar char="Ø"/>
             </a:pPr>
             <a:r>
-              <a:rPr lang="fr-FR" sz="3100" dirty="0"/>
-              <a:t>déroulement :</a:t>
-            </a:r>
+              <a:rPr lang="fr-FR" dirty="0" smtClean="0"/>
+              <a:t>Déroulement </a:t>
+            </a:r>
+            <a:endParaRPr lang="fr-FR" dirty="0"/>
           </a:p>
           <a:p>
             <a:pPr lvl="2">
@@ -7733,12 +7747,20 @@
                 <a:schemeClr val="tx2"/>
               </a:buClr>
               <a:buSzPct val="100000"/>
-              <a:buFont typeface="Wingdings" panose="05000000000000000000" pitchFamily="2" charset="2"/>
-              <a:buChar char="Ø"/>
+              <a:buFont typeface="Courier New"/>
+              <a:buChar char="o"/>
             </a:pPr>
             <a:r>
-              <a:rPr lang="fr-FR" sz="2600" dirty="0"/>
-              <a:t>Daily stand-up </a:t>
+              <a:rPr lang="fr-FR" sz="2200" dirty="0"/>
+              <a:t>D</a:t>
+            </a:r>
+            <a:r>
+              <a:rPr lang="fr-FR" sz="2200" dirty="0" smtClean="0"/>
+              <a:t>aily </a:t>
+            </a:r>
+            <a:r>
+              <a:rPr lang="fr-FR" sz="2200" dirty="0"/>
+              <a:t>stand-up </a:t>
             </a:r>
           </a:p>
           <a:p>
@@ -7747,18 +7769,22 @@
                 <a:schemeClr val="tx2"/>
               </a:buClr>
               <a:buSzPct val="100000"/>
-              <a:buFont typeface="Wingdings" panose="05000000000000000000" pitchFamily="2" charset="2"/>
-              <a:buChar char="Ø"/>
+              <a:buFont typeface="Courier New"/>
+              <a:buChar char="o"/>
             </a:pPr>
             <a:r>
-              <a:rPr lang="fr-FR" sz="2600" dirty="0"/>
-              <a:t>Sprint </a:t>
-            </a:r>
-            <a:r>
-              <a:rPr lang="fr-FR" sz="2600" dirty="0" err="1"/>
+              <a:rPr lang="fr-FR" sz="2200" dirty="0"/>
+              <a:t>S</a:t>
+            </a:r>
+            <a:r>
+              <a:rPr lang="fr-FR" sz="2200" dirty="0" smtClean="0"/>
+              <a:t>print </a:t>
+            </a:r>
+            <a:r>
+              <a:rPr lang="fr-FR" sz="2200" dirty="0" err="1"/>
               <a:t>review</a:t>
             </a:r>
-            <a:endParaRPr lang="fr-FR" sz="2600" dirty="0"/>
+            <a:endParaRPr lang="fr-FR" sz="2200" dirty="0"/>
           </a:p>
           <a:p>
             <a:pPr lvl="2">
@@ -7766,16 +7792,16 @@
                 <a:schemeClr val="tx2"/>
               </a:buClr>
               <a:buSzPct val="100000"/>
-              <a:buFont typeface="Wingdings" panose="05000000000000000000" pitchFamily="2" charset="2"/>
-              <a:buChar char="Ø"/>
+              <a:buFont typeface="Courier New"/>
+              <a:buChar char="o"/>
             </a:pPr>
             <a:r>
-              <a:rPr lang="fr-FR" sz="2600" dirty="0" err="1"/>
+              <a:rPr lang="fr-FR" sz="2200" dirty="0" err="1"/>
               <a:t>Backlog</a:t>
             </a:r>
             <a:r>
-              <a:rPr lang="fr-FR" sz="2600" dirty="0"/>
-              <a:t> en évolution constante</a:t>
+              <a:rPr lang="fr-FR" sz="2200" dirty="0"/>
+              <a:t> évolutive</a:t>
             </a:r>
           </a:p>
           <a:p>
@@ -7784,41 +7810,35 @@
                 <a:schemeClr val="tx2"/>
               </a:buClr>
               <a:buSzPct val="100000"/>
-              <a:buFont typeface="Wingdings" panose="05000000000000000000" pitchFamily="2" charset="2"/>
-              <a:buChar char="Ø"/>
+              <a:buFont typeface="Courier New"/>
+              <a:buChar char="o"/>
             </a:pPr>
             <a:r>
-              <a:rPr lang="fr-FR" sz="2600" dirty="0"/>
-              <a:t>Système de </a:t>
-            </a:r>
-            <a:r>
-              <a:rPr lang="fr-FR" sz="2600" dirty="0" err="1"/>
-              <a:t>versioning</a:t>
-            </a:r>
-            <a:r>
-              <a:rPr lang="fr-FR" sz="2600" dirty="0"/>
-              <a:t> Git =&gt; mise à jour instantanée si changements majeurs dans le code</a:t>
-            </a:r>
-          </a:p>
-          <a:p>
-            <a:pPr>
-              <a:spcBef>
-                <a:spcPts val="1200"/>
-              </a:spcBef>
-              <a:spcAft>
-                <a:spcPts val="600"/>
-              </a:spcAft>
+              <a:rPr lang="fr-FR" sz="2200" dirty="0" smtClean="0"/>
+              <a:t>Git</a:t>
+            </a:r>
+          </a:p>
+          <a:p>
+            <a:pPr marL="806354" lvl="2" indent="0">
               <a:buClr>
                 <a:schemeClr val="tx2"/>
               </a:buClr>
               <a:buSzPct val="100000"/>
-              <a:buFont typeface="Wingdings" panose="05000000000000000000" pitchFamily="2" charset="2"/>
-              <a:buChar char="Ø"/>
+              <a:buNone/>
             </a:pPr>
-            <a:r>
-              <a:rPr lang="fr-FR" sz="3100" dirty="0"/>
-              <a:t>détails des sprints :</a:t>
-            </a:r>
+            <a:endParaRPr lang="fr-FR" sz="2200" dirty="0"/>
+          </a:p>
+          <a:p>
+            <a:pPr>
+              <a:spcAft>
+                <a:spcPts val="600"/>
+              </a:spcAft>
+            </a:pPr>
+            <a:r>
+              <a:rPr lang="fr-FR" dirty="0" smtClean="0"/>
+              <a:t>Sprint 1</a:t>
+            </a:r>
+            <a:endParaRPr lang="fr-FR" dirty="0"/>
           </a:p>
           <a:p>
             <a:pPr lvl="2">
@@ -7826,91 +7846,73 @@
                 <a:schemeClr val="tx2"/>
               </a:buClr>
               <a:buSzPct val="100000"/>
-              <a:buFont typeface="Wingdings" panose="05000000000000000000" pitchFamily="2" charset="2"/>
-              <a:buChar char="Ø"/>
+              <a:buFont typeface="Courier New"/>
+              <a:buChar char="o"/>
             </a:pPr>
             <a:r>
-              <a:rPr lang="fr-FR" sz="2600" dirty="0"/>
-              <a:t>Sprint 1 : </a:t>
-            </a:r>
-          </a:p>
-          <a:p>
-            <a:pPr lvl="3">
+              <a:rPr lang="fr-FR" sz="2200" dirty="0" smtClean="0"/>
+              <a:t>Environnement </a:t>
+            </a:r>
+            <a:r>
+              <a:rPr lang="fr-FR" sz="2200" dirty="0"/>
+              <a:t>de travail</a:t>
+            </a:r>
+          </a:p>
+          <a:p>
+            <a:pPr lvl="2">
               <a:buClr>
                 <a:schemeClr val="tx2"/>
               </a:buClr>
               <a:buSzPct val="100000"/>
-              <a:buFont typeface="Wingdings" panose="05000000000000000000" pitchFamily="2" charset="2"/>
-              <a:buChar char="Ø"/>
+              <a:buFont typeface="Courier New"/>
+              <a:buChar char="o"/>
             </a:pPr>
             <a:r>
-              <a:rPr lang="fr-FR" sz="2600" dirty="0"/>
-              <a:t>Préparer le terrain « informatiquement » parlant</a:t>
-            </a:r>
-          </a:p>
-          <a:p>
-            <a:pPr lvl="3">
+              <a:rPr lang="fr-FR" sz="2200" dirty="0"/>
+              <a:t>Dessiner la fenêtre principale</a:t>
+            </a:r>
+          </a:p>
+          <a:p>
+            <a:pPr lvl="2">
               <a:buClr>
                 <a:schemeClr val="tx2"/>
               </a:buClr>
               <a:buSzPct val="100000"/>
-              <a:buFont typeface="Wingdings" panose="05000000000000000000" pitchFamily="2" charset="2"/>
-              <a:buChar char="Ø"/>
+              <a:buFont typeface="Courier New"/>
+              <a:buChar char="o"/>
             </a:pPr>
             <a:r>
-              <a:rPr lang="fr-FR" sz="2600" dirty="0"/>
-              <a:t>Dessiner la fenêtre principale =&gt; cadre</a:t>
-            </a:r>
-          </a:p>
-          <a:p>
-            <a:pPr lvl="3">
+              <a:rPr lang="fr-FR" sz="2200" dirty="0"/>
+              <a:t>Premières connexions</a:t>
+            </a:r>
+          </a:p>
+          <a:p>
+            <a:pPr lvl="2">
               <a:buClr>
                 <a:schemeClr val="tx2"/>
               </a:buClr>
               <a:buSzPct val="100000"/>
-              <a:buFont typeface="Wingdings" panose="05000000000000000000" pitchFamily="2" charset="2"/>
-              <a:buChar char="Ø"/>
+              <a:buFont typeface="Courier New"/>
+              <a:buChar char="o"/>
             </a:pPr>
             <a:r>
-              <a:rPr lang="fr-FR" sz="2600" dirty="0"/>
-              <a:t>Premières connexions : fermeture fenêtre, ouverture fichier</a:t>
-            </a:r>
-          </a:p>
-          <a:p>
-            <a:pPr lvl="3">
+              <a:rPr lang="fr-FR" sz="2200" dirty="0"/>
+              <a:t>Lecture MNT</a:t>
+            </a:r>
+          </a:p>
+          <a:p>
+            <a:pPr lvl="2">
               <a:buClr>
                 <a:schemeClr val="tx2"/>
               </a:buClr>
               <a:buSzPct val="100000"/>
-              <a:buFont typeface="Wingdings" panose="05000000000000000000" pitchFamily="2" charset="2"/>
-              <a:buChar char="Ø"/>
+              <a:buFont typeface="Courier New"/>
+              <a:buChar char="o"/>
             </a:pPr>
             <a:r>
-              <a:rPr lang="fr-FR" sz="2600" dirty="0"/>
-              <a:t>Lecture du fichier de coordonnées du MNT</a:t>
-            </a:r>
-          </a:p>
-          <a:p>
-            <a:pPr lvl="3">
-              <a:buClr>
-                <a:schemeClr val="tx2"/>
-              </a:buClr>
-              <a:buSzPct val="100000"/>
-              <a:buFont typeface="Wingdings" panose="05000000000000000000" pitchFamily="2" charset="2"/>
-              <a:buChar char="Ø"/>
-            </a:pPr>
-            <a:r>
-              <a:rPr lang="fr-FR" sz="2600" dirty="0"/>
-              <a:t>Documentation OpenGL et </a:t>
-            </a:r>
-            <a:r>
-              <a:rPr lang="fr-FR" sz="2600" dirty="0" err="1"/>
-              <a:t>Qt</a:t>
-            </a:r>
-            <a:endParaRPr lang="fr-FR" sz="2600" dirty="0"/>
-          </a:p>
-          <a:p>
-            <a:endParaRPr lang="fr-FR" dirty="0"/>
+              <a:rPr lang="fr-FR" sz="2200" dirty="0"/>
+              <a:t>Documentation</a:t>
+            </a:r>
           </a:p>
         </p:txBody>
       </p:sp>
@@ -7983,6 +7985,11 @@
         </p:txBody>
       </p:sp>
     </p:spTree>
+    <p:extLst>
+      <p:ext uri="{BB962C8B-B14F-4D97-AF65-F5344CB8AC3E}">
+        <p14:creationId xmlns:p14="http://schemas.microsoft.com/office/powerpoint/2010/main" val="3254827934"/>
+      </p:ext>
+    </p:extLst>
   </p:cSld>
   <p:clrMapOvr>
     <a:masterClrMapping/>
@@ -7990,7 +7997,7 @@
   <p:timing>
     <p:tnLst>
       <p:par>
-        <p:cTn id="1" dur="indefinite" restart="never" nodeType="tmRoot"/>
+        <p:cTn xmlns:p14="http://schemas.microsoft.com/office/powerpoint/2010/main" id="1" dur="indefinite" restart="never" nodeType="tmRoot"/>
       </p:par>
     </p:tnLst>
   </p:timing>
@@ -8024,136 +8031,183 @@
             <p:ph sz="quarter" idx="1"/>
           </p:nvPr>
         </p:nvSpPr>
-        <p:spPr/>
-        <p:txBody>
-          <a:bodyPr/>
-          <a:lstStyle/>
+        <p:spPr>
+          <a:xfrm>
+            <a:off x="504031" y="1763924"/>
+            <a:ext cx="8232510" cy="5795751"/>
+          </a:xfrm>
+        </p:spPr>
+        <p:txBody>
+          <a:bodyPr>
+            <a:normAutofit/>
+          </a:bodyPr>
+          <a:lstStyle/>
+          <a:p>
+            <a:pPr>
+              <a:spcAft>
+                <a:spcPts val="600"/>
+              </a:spcAft>
+            </a:pPr>
+            <a:r>
+              <a:rPr lang="fr-FR" dirty="0"/>
+              <a:t>Sprint 2</a:t>
+            </a:r>
+          </a:p>
           <a:p>
             <a:pPr lvl="2">
-              <a:buSzPct val="25000"/>
-              <a:buFont typeface="StarSymbol"/>
-              <a:buChar char=""/>
+              <a:buClr>
+                <a:schemeClr val="tx2"/>
+              </a:buClr>
+              <a:buSzPct val="100000"/>
+              <a:buFont typeface="Courier New"/>
+              <a:buChar char="o"/>
             </a:pPr>
             <a:r>
+              <a:rPr lang="fr-FR" sz="2200" dirty="0"/>
+              <a:t>Affichage du MNT</a:t>
+            </a:r>
+          </a:p>
+          <a:p>
+            <a:pPr lvl="2">
+              <a:buClr>
+                <a:schemeClr val="tx2"/>
+              </a:buClr>
+              <a:buSzPct val="100000"/>
+              <a:buFont typeface="Courier New"/>
+              <a:buChar char="o"/>
+            </a:pPr>
+            <a:r>
+              <a:rPr lang="fr-FR" sz="2200" dirty="0"/>
+              <a:t>Paramétrage point de départ</a:t>
+            </a:r>
+          </a:p>
+          <a:p>
+            <a:pPr lvl="2">
+              <a:buClr>
+                <a:schemeClr val="tx2"/>
+              </a:buClr>
+              <a:buSzPct val="100000"/>
+              <a:buFont typeface="Courier New"/>
+              <a:buChar char="o"/>
+            </a:pPr>
+            <a:r>
+              <a:rPr lang="fr-FR" sz="2200" dirty="0" smtClean="0"/>
+              <a:t>Algorithme</a:t>
+            </a:r>
+          </a:p>
+          <a:p>
+            <a:pPr lvl="2">
+              <a:buClr>
+                <a:schemeClr val="tx2"/>
+              </a:buClr>
+              <a:buSzPct val="100000"/>
+              <a:buFont typeface="Courier New"/>
+              <a:buChar char="o"/>
+            </a:pPr>
+            <a:endParaRPr lang="fr-FR" sz="2200" dirty="0"/>
+          </a:p>
+          <a:p>
+            <a:pPr marL="806354" lvl="2" indent="0">
+              <a:buClr>
+                <a:schemeClr val="tx2"/>
+              </a:buClr>
+              <a:buSzPct val="100000"/>
+              <a:buNone/>
+            </a:pPr>
+            <a:endParaRPr lang="fr-FR" sz="2200" dirty="0"/>
+          </a:p>
+          <a:p>
+            <a:pPr lvl="2">
+              <a:buClr>
+                <a:schemeClr val="tx2"/>
+              </a:buClr>
+              <a:buSzPct val="100000"/>
+              <a:buFont typeface="Courier New"/>
+              <a:buChar char="o"/>
+            </a:pPr>
+            <a:endParaRPr lang="fr-FR" dirty="0" smtClean="0"/>
+          </a:p>
+          <a:p>
+            <a:pPr>
+              <a:spcAft>
+                <a:spcPts val="600"/>
+              </a:spcAft>
+            </a:pPr>
+            <a:endParaRPr lang="fr-FR" dirty="0" smtClean="0"/>
+          </a:p>
+          <a:p>
+            <a:pPr>
+              <a:spcAft>
+                <a:spcPts val="600"/>
+              </a:spcAft>
+            </a:pPr>
+            <a:r>
+              <a:rPr lang="fr-FR" dirty="0" smtClean="0"/>
+              <a:t>Sprint </a:t>
+            </a:r>
+            <a:r>
               <a:rPr lang="fr-FR" dirty="0"/>
-              <a:t>Sprint 2 : </a:t>
-            </a:r>
-          </a:p>
-          <a:p>
-            <a:pPr lvl="3">
-              <a:buSzPct val="25000"/>
-              <a:buFont typeface="StarSymbol"/>
-              <a:buChar char=""/>
+              <a:t>3</a:t>
+            </a:r>
+          </a:p>
+          <a:p>
+            <a:pPr lvl="2">
+              <a:buClr>
+                <a:schemeClr val="tx2"/>
+              </a:buClr>
+              <a:buSzPct val="100000"/>
+              <a:buFont typeface="Courier New"/>
+              <a:buChar char="o"/>
             </a:pPr>
             <a:r>
-              <a:rPr lang="fr-FR" dirty="0"/>
-              <a:t>Affichage du MNT avec </a:t>
-            </a:r>
-            <a:r>
-              <a:rPr lang="fr-FR" dirty="0" err="1"/>
-              <a:t>libQGLviewer</a:t>
-            </a:r>
-            <a:endParaRPr lang="fr-FR" dirty="0"/>
-          </a:p>
-          <a:p>
-            <a:pPr lvl="3">
-              <a:buSzPct val="25000"/>
-              <a:buFont typeface="StarSymbol"/>
-              <a:buChar char=""/>
+              <a:rPr lang="fr-FR" sz="2200" dirty="0" err="1"/>
+              <a:t>Débugs</a:t>
+            </a:r>
+            <a:r>
+              <a:rPr lang="fr-FR" sz="2200" dirty="0"/>
+              <a:t> !</a:t>
+            </a:r>
+          </a:p>
+          <a:p>
+            <a:pPr lvl="2">
+              <a:buClr>
+                <a:schemeClr val="tx2"/>
+              </a:buClr>
+              <a:buSzPct val="100000"/>
+              <a:buFont typeface="Courier New"/>
+              <a:buChar char="o"/>
             </a:pPr>
             <a:r>
-              <a:rPr lang="fr-FR" dirty="0"/>
-              <a:t>Codage de l’algorithme du chemin d'écoulement</a:t>
-            </a:r>
-          </a:p>
-          <a:p>
-            <a:pPr lvl="3">
-              <a:buSzPct val="25000"/>
-              <a:buFont typeface="StarSymbol"/>
-              <a:buChar char=""/>
+              <a:rPr lang="fr-FR" sz="2200" dirty="0"/>
+              <a:t>Optimisation affichage</a:t>
+            </a:r>
+          </a:p>
+          <a:p>
+            <a:pPr lvl="2">
+              <a:buClr>
+                <a:schemeClr val="tx2"/>
+              </a:buClr>
+              <a:buSzPct val="100000"/>
+              <a:buFont typeface="Courier New"/>
+              <a:buChar char="o"/>
             </a:pPr>
             <a:r>
-              <a:rPr lang="fr-FR" dirty="0"/>
-              <a:t>Paramétrage du point de départ du parcours par la récupération des coordonnées sous un clic-souris</a:t>
-            </a:r>
-          </a:p>
-          <a:p>
-            <a:pPr lvl="3">
-              <a:buSzPct val="25000"/>
-              <a:buFont typeface="StarSymbol"/>
-              <a:buChar char=""/>
+              <a:rPr lang="fr-FR" sz="2200" dirty="0"/>
+              <a:t>Interface graphique</a:t>
+            </a:r>
+          </a:p>
+          <a:p>
+            <a:pPr lvl="2">
+              <a:buClr>
+                <a:schemeClr val="tx2"/>
+              </a:buClr>
+              <a:buSzPct val="100000"/>
+              <a:buFont typeface="Courier New"/>
+              <a:buChar char="o"/>
             </a:pPr>
-            <a:endParaRPr lang="fr-FR" dirty="0"/>
-          </a:p>
-          <a:p>
-            <a:pPr lvl="2">
-              <a:buSzPct val="25000"/>
-              <a:buFont typeface="StarSymbol"/>
-              <a:buChar char=""/>
-            </a:pPr>
-            <a:r>
-              <a:rPr lang="fr-FR" dirty="0"/>
-              <a:t>Sprint 3 : </a:t>
-            </a:r>
-          </a:p>
-          <a:p>
-            <a:pPr lvl="3">
-              <a:buSzPct val="25000"/>
-              <a:buFont typeface="StarSymbol"/>
-              <a:buChar char=""/>
-            </a:pPr>
-            <a:r>
-              <a:rPr lang="fr-FR" dirty="0" err="1"/>
-              <a:t>Débugs</a:t>
-            </a:r>
-            <a:r>
-              <a:rPr lang="fr-FR" dirty="0"/>
-              <a:t> ! </a:t>
-            </a:r>
-          </a:p>
-          <a:p>
-            <a:pPr lvl="3">
-              <a:buSzPct val="25000"/>
-              <a:buFont typeface="StarSymbol"/>
-              <a:buChar char=""/>
-            </a:pPr>
-            <a:r>
-              <a:rPr lang="fr-FR" dirty="0"/>
-              <a:t>Optimisation affichage du MNT et du chemin =&gt; couleur, primitive, historiques des chemins créés</a:t>
-            </a:r>
-          </a:p>
-          <a:p>
-            <a:pPr lvl="3">
-              <a:buSzPct val="25000"/>
-              <a:buFont typeface="StarSymbol"/>
-              <a:buChar char=""/>
-            </a:pPr>
-            <a:r>
-              <a:rPr lang="fr-FR" dirty="0"/>
-              <a:t>Amélioration de l'interface =&gt; barre de progression, log avec messages d'avancement, </a:t>
-            </a:r>
-            <a:r>
-              <a:rPr lang="fr-FR" dirty="0" err="1"/>
-              <a:t>infos-bulle</a:t>
-            </a:r>
-            <a:r>
-              <a:rPr lang="fr-FR" dirty="0"/>
-              <a:t>...</a:t>
-            </a:r>
-          </a:p>
-          <a:p>
-            <a:pPr lvl="3">
-              <a:buSzPct val="25000"/>
-              <a:buFont typeface="StarSymbol"/>
-              <a:buChar char=""/>
-            </a:pPr>
-            <a:r>
-              <a:rPr lang="fr-FR" dirty="0"/>
-              <a:t>Fonctions d'export image du chemin et des coordonnées des chemins en fichier </a:t>
-            </a:r>
-            <a:r>
-              <a:rPr lang="fr-FR" dirty="0" smtClean="0"/>
-              <a:t>texte</a:t>
+            <a:r>
+              <a:rPr lang="fr-FR" sz="2200" dirty="0"/>
+              <a:t>Fonctions d’export</a:t>
             </a:r>
           </a:p>
         </p:txBody>
@@ -8226,7 +8280,42 @@
           </a:p>
         </p:txBody>
       </p:sp>
+      <p:pic>
+        <p:nvPicPr>
+          <p:cNvPr id="5" name="Image 4" descr="Capture d’écran 2015-12-03 à 07.43.02.png"/>
+          <p:cNvPicPr>
+            <a:picLocks noChangeAspect="1"/>
+          </p:cNvPicPr>
+          <p:nvPr/>
+        </p:nvPicPr>
+        <p:blipFill>
+          <a:blip r:embed="rId2">
+            <a:extLst>
+              <a:ext uri="{28A0092B-C50C-407E-A947-70E740481C1C}">
+                <a14:useLocalDpi xmlns:a14="http://schemas.microsoft.com/office/drawing/2010/main" val="0"/>
+              </a:ext>
+            </a:extLst>
+          </a:blip>
+          <a:stretch>
+            <a:fillRect/>
+          </a:stretch>
+        </p:blipFill>
+        <p:spPr>
+          <a:xfrm>
+            <a:off x="-13980" y="3635821"/>
+            <a:ext cx="10080625" cy="1530566"/>
+          </a:xfrm>
+          <a:prstGeom prst="rect">
+            <a:avLst/>
+          </a:prstGeom>
+        </p:spPr>
+      </p:pic>
     </p:spTree>
+    <p:extLst>
+      <p:ext uri="{BB962C8B-B14F-4D97-AF65-F5344CB8AC3E}">
+        <p14:creationId xmlns:p14="http://schemas.microsoft.com/office/powerpoint/2010/main" val="1678783871"/>
+      </p:ext>
+    </p:extLst>
   </p:cSld>
   <p:clrMapOvr>
     <a:masterClrMapping/>
@@ -8234,7 +8323,7 @@
   <p:timing>
     <p:tnLst>
       <p:par>
-        <p:cTn id="1" dur="indefinite" restart="never" nodeType="tmRoot"/>
+        <p:cTn xmlns:p14="http://schemas.microsoft.com/office/powerpoint/2010/main" id="1" dur="indefinite" restart="never" nodeType="tmRoot"/>
       </p:par>
     </p:tnLst>
   </p:timing>
@@ -8282,7 +8371,7 @@
               <a:buChar char="+"/>
             </a:pPr>
             <a:r>
-              <a:rPr lang="fr-FR" sz="2400" dirty="0"/>
+              <a:rPr lang="fr-FR" dirty="0"/>
               <a:t>MEGAFI = outil simple mais fonctionnel</a:t>
             </a:r>
           </a:p>
@@ -8296,9 +8385,18 @@
               <a:buChar char="+"/>
             </a:pPr>
             <a:r>
-              <a:rPr lang="fr-FR" sz="2400" dirty="0"/>
-              <a:t>gestion de projet SCRUM régulière et appliquée</a:t>
-            </a:r>
+              <a:rPr lang="fr-FR" dirty="0"/>
+              <a:t>G</a:t>
+            </a:r>
+            <a:r>
+              <a:rPr lang="fr-FR" dirty="0" smtClean="0"/>
+              <a:t>estion </a:t>
+            </a:r>
+            <a:r>
+              <a:rPr lang="fr-FR" dirty="0"/>
+              <a:t>de projet SCRUM </a:t>
+            </a:r>
+            <a:endParaRPr lang="fr-FR" dirty="0" smtClean="0"/>
           </a:p>
           <a:p>
             <a:pPr>
@@ -8310,9 +8408,20 @@
               <a:buChar char="+"/>
             </a:pPr>
             <a:r>
-              <a:rPr lang="fr-FR" sz="2400" dirty="0"/>
-              <a:t>réel fonctionnement d'équipe où chacun a sa place</a:t>
-            </a:r>
+              <a:rPr lang="fr-FR" dirty="0" smtClean="0"/>
+              <a:t>Équipe solidaire</a:t>
+            </a:r>
+          </a:p>
+          <a:p>
+            <a:pPr>
+              <a:buClr>
+                <a:schemeClr val="tx2"/>
+              </a:buClr>
+              <a:buSzPct val="100000"/>
+              <a:buFont typeface="Verdana" panose="020B0604030504040204" pitchFamily="34" charset="0"/>
+              <a:buChar char="+"/>
+            </a:pPr>
+            <a:endParaRPr lang="fr-FR" dirty="0"/>
           </a:p>
           <a:p>
             <a:pPr>
@@ -8324,8 +8433,20 @@
               <a:buChar char="‒"/>
             </a:pPr>
             <a:r>
-              <a:rPr lang="fr-FR" sz="2400" dirty="0"/>
-              <a:t>beaucoup de fonctionnalités non réalisées</a:t>
+              <a:rPr lang="fr-FR" dirty="0"/>
+              <a:t>F</a:t>
+            </a:r>
+            <a:r>
+              <a:rPr lang="fr-FR" dirty="0" smtClean="0"/>
+              <a:t>onctionnalités </a:t>
+            </a:r>
+            <a:r>
+              <a:rPr lang="fr-FR" dirty="0"/>
+              <a:t>non </a:t>
+            </a:r>
+            <a:r>
+              <a:rPr lang="fr-FR" dirty="0" smtClean="0"/>
+              <a:t>réalisées</a:t>
             </a:r>
           </a:p>
           <a:p>
@@ -8338,9 +8459,14 @@
               <a:buChar char="‒"/>
             </a:pPr>
             <a:r>
-              <a:rPr lang="fr-FR" sz="2400" dirty="0"/>
-              <a:t>manque de réflexion par rapport au but de l'outil</a:t>
-            </a:r>
+              <a:rPr lang="fr-FR" dirty="0"/>
+              <a:t>Manque d'outils d'aide au </a:t>
+            </a:r>
+            <a:r>
+              <a:rPr lang="fr-FR" dirty="0" smtClean="0"/>
+              <a:t>développement</a:t>
+            </a:r>
+            <a:endParaRPr lang="fr-FR" dirty="0"/>
           </a:p>
           <a:p>
             <a:pPr>
@@ -8352,9 +8478,10 @@
               <a:buChar char="‒"/>
             </a:pPr>
             <a:r>
-              <a:rPr lang="fr-FR" sz="2400" dirty="0"/>
-              <a:t>pas d'utilisation d'outils d'aide au développement</a:t>
-            </a:r>
+              <a:rPr lang="fr-FR" dirty="0" smtClean="0"/>
+              <a:t>Gestion de projet SCRUM</a:t>
+            </a:r>
+            <a:endParaRPr lang="fr-FR" dirty="0"/>
           </a:p>
           <a:p>
             <a:endParaRPr lang="fr-FR" sz="2400" dirty="0"/>
@@ -8430,6 +8557,11 @@
         </p:txBody>
       </p:sp>
     </p:spTree>
+    <p:extLst>
+      <p:ext uri="{BB962C8B-B14F-4D97-AF65-F5344CB8AC3E}">
+        <p14:creationId xmlns:p14="http://schemas.microsoft.com/office/powerpoint/2010/main" val="1173085180"/>
+      </p:ext>
+    </p:extLst>
   </p:cSld>
   <p:clrMapOvr>
     <a:masterClrMapping/>
@@ -8437,7 +8569,7 @@
   <p:timing>
     <p:tnLst>
       <p:par>
-        <p:cTn id="1" dur="indefinite" restart="never" nodeType="tmRoot"/>
+        <p:cTn xmlns:p14="http://schemas.microsoft.com/office/powerpoint/2010/main" id="1" dur="indefinite" restart="never" nodeType="tmRoot"/>
       </p:par>
     </p:tnLst>
   </p:timing>
@@ -8713,7 +8845,7 @@
   <p:timing>
     <p:tnLst>
       <p:par>
-        <p:cTn id="1" dur="indefinite" restart="never" nodeType="tmRoot"/>
+        <p:cTn xmlns:p14="http://schemas.microsoft.com/office/powerpoint/2010/main" id="1" dur="indefinite" restart="never" nodeType="tmRoot"/>
       </p:par>
     </p:tnLst>
   </p:timing>
@@ -8791,7 +8923,7 @@
   <p:timing>
     <p:tnLst>
       <p:par>
-        <p:cTn id="1" dur="indefinite" restart="never" nodeType="tmRoot"/>
+        <p:cTn xmlns:p14="http://schemas.microsoft.com/office/powerpoint/2010/main" id="1" dur="indefinite" restart="never" nodeType="tmRoot"/>
       </p:par>
     </p:tnLst>
   </p:timing>
@@ -8897,7 +9029,7 @@
           <p:nvPr/>
         </p:nvPicPr>
         <p:blipFill>
-          <a:blip r:embed="rId2"/>
+          <a:blip/>
           <a:stretch>
             <a:fillRect/>
           </a:stretch>
@@ -8957,7 +9089,7 @@
   <p:timing>
     <p:tnLst>
       <p:par>
-        <p:cTn id="1" dur="indefinite" restart="never" nodeType="tmRoot"/>
+        <p:cTn xmlns:p14="http://schemas.microsoft.com/office/powerpoint/2010/main" id="1" dur="indefinite" restart="never" nodeType="tmRoot"/>
       </p:par>
     </p:tnLst>
   </p:timing>
@@ -9204,7 +9336,7 @@
   <p:timing>
     <p:tnLst>
       <p:par>
-        <p:cTn id="1" dur="indefinite" restart="never" nodeType="tmRoot"/>
+        <p:cTn xmlns:p14="http://schemas.microsoft.com/office/powerpoint/2010/main" id="1" dur="indefinite" restart="never" nodeType="tmRoot"/>
       </p:par>
     </p:tnLst>
   </p:timing>
@@ -9426,7 +9558,7 @@
   <p:timing>
     <p:tnLst>
       <p:par>
-        <p:cTn id="1" dur="indefinite" restart="never" nodeType="tmRoot"/>
+        <p:cTn xmlns:p14="http://schemas.microsoft.com/office/powerpoint/2010/main" id="1" dur="indefinite" restart="never" nodeType="tmRoot"/>
       </p:par>
     </p:tnLst>
   </p:timing>
@@ -9491,7 +9623,7 @@
           </p:nvPr>
         </p:nvPicPr>
         <p:blipFill>
-          <a:blip r:embed="rId3"/>
+          <a:blip/>
           <a:stretch>
             <a:fillRect/>
           </a:stretch>
@@ -9661,7 +9793,7 @@
   <p:timing>
     <p:tnLst>
       <p:par>
-        <p:cTn id="1" dur="indefinite" restart="never" nodeType="tmRoot">
+        <p:cTn xmlns:p14="http://schemas.microsoft.com/office/powerpoint/2010/main" id="1" dur="indefinite" restart="never" nodeType="tmRoot">
           <p:childTnLst>
             <p:seq concurrent="1" nextAc="seek">
               <p:cTn id="2" dur="indefinite" nodeType="mainSeq">
@@ -9829,7 +9961,7 @@
   <p:timing>
     <p:tnLst>
       <p:par>
-        <p:cTn id="1" dur="indefinite" restart="never" nodeType="tmRoot"/>
+        <p:cTn xmlns:p14="http://schemas.microsoft.com/office/powerpoint/2010/main" id="1" dur="indefinite" restart="never" nodeType="tmRoot"/>
       </p:par>
     </p:tnLst>
   </p:timing>
@@ -9968,7 +10100,7 @@
           <p:nvPr/>
         </p:nvPicPr>
         <p:blipFill>
-          <a:blip r:embed="rId2" cstate="print">
+          <a:blip cstate="print">
             <a:extLst>
               <a:ext uri="{28A0092B-C50C-407E-A947-70E740481C1C}">
                 <a14:useLocalDpi xmlns:a14="http://schemas.microsoft.com/office/drawing/2010/main" val="0"/>
@@ -9998,7 +10130,7 @@
           <p:nvPr/>
         </p:nvPicPr>
         <p:blipFill>
-          <a:blip r:embed="rId3" cstate="print">
+          <a:blip cstate="print">
             <a:extLst>
               <a:ext uri="{28A0092B-C50C-407E-A947-70E740481C1C}">
                 <a14:useLocalDpi xmlns:a14="http://schemas.microsoft.com/office/drawing/2010/main" val="0"/>
@@ -10239,7 +10371,7 @@
   <p:timing>
     <p:tnLst>
       <p:par>
-        <p:cTn id="1" dur="indefinite" restart="never" nodeType="tmRoot"/>
+        <p:cTn xmlns:p14="http://schemas.microsoft.com/office/powerpoint/2010/main" id="1" dur="indefinite" restart="never" nodeType="tmRoot"/>
       </p:par>
     </p:tnLst>
   </p:timing>

</xml_diff>